<commit_message>
refactor: dirs, filenames, tests
</commit_message>
<xml_diff>
--- a/__tests__/pptx-templates/ChartBubbles.pptx
+++ b/__tests__/pptx-templates/ChartBubbles.pptx
@@ -133,9 +133,9 @@
           <c:layoutTarget val="inner"/>
           <c:xMode val="edge"/>
           <c:yMode val="edge"/>
-          <c:x val="6.1380715032900227E-2"/>
-          <c:y val="3.655241647672948E-2"/>
-          <c:w val="0.90939134786471221"/>
+          <c:x val="4.542346482598069E-2"/>
+          <c:y val="3.6552416476729493E-2"/>
+          <c:w val="0.77857934400054729"/>
           <c:h val="0.8911129106201382"/>
         </c:manualLayout>
       </c:layout>
@@ -146,11 +146,11 @@
           <c:order val="0"/>
           <c:tx>
             <c:strRef>
-              <c:f>Tabelle1!$D$1</c:f>
+              <c:f>Tabelle1!$B$1</c:f>
               <c:strCache>
                 <c:ptCount val="1"/>
                 <c:pt idx="0">
-                  <c:v>Series 2</c:v>
+                  <c:v>Series1-X</c:v>
                 </c:pt>
               </c:strCache>
             </c:strRef>
@@ -159,15 +159,124 @@
             <a:solidFill>
               <a:schemeClr val="accent2"/>
             </a:solidFill>
-            <a:ln>
-              <a:noFill/>
+            <a:ln w="25400">
+              <a:solidFill>
+                <a:schemeClr val="bg1"/>
+              </a:solidFill>
             </a:ln>
             <a:effectLst/>
           </c:spPr>
           <c:invertIfNegative val="0"/>
           <c:xVal>
             <c:numRef>
+              <c:f>Tabelle1!$B$2:$B$6</c:f>
+              <c:numCache>
+                <c:formatCode>General</c:formatCode>
+                <c:ptCount val="5"/>
+                <c:pt idx="0">
+                  <c:v>5</c:v>
+                </c:pt>
+                <c:pt idx="1">
+                  <c:v>12</c:v>
+                </c:pt>
+                <c:pt idx="2">
+                  <c:v>15</c:v>
+                </c:pt>
+                <c:pt idx="3">
+                  <c:v>6</c:v>
+                </c:pt>
+                <c:pt idx="4">
+                  <c:v>5</c:v>
+                </c:pt>
+              </c:numCache>
+            </c:numRef>
+          </c:xVal>
+          <c:yVal>
+            <c:numRef>
+              <c:f>Tabelle1!$C$2:$C$6</c:f>
+              <c:numCache>
+                <c:formatCode>General</c:formatCode>
+                <c:ptCount val="5"/>
+                <c:pt idx="0">
+                  <c:v>3</c:v>
+                </c:pt>
+                <c:pt idx="1">
+                  <c:v>3</c:v>
+                </c:pt>
+                <c:pt idx="2">
+                  <c:v>10</c:v>
+                </c:pt>
+                <c:pt idx="3">
+                  <c:v>8</c:v>
+                </c:pt>
+                <c:pt idx="4">
+                  <c:v>15</c:v>
+                </c:pt>
+              </c:numCache>
+            </c:numRef>
+          </c:yVal>
+          <c:bubbleSize>
+            <c:numRef>
               <c:f>Tabelle1!$D$2:$D$6</c:f>
+              <c:numCache>
+                <c:formatCode>General</c:formatCode>
+                <c:ptCount val="5"/>
+                <c:pt idx="0">
+                  <c:v>12</c:v>
+                </c:pt>
+                <c:pt idx="1">
+                  <c:v>14</c:v>
+                </c:pt>
+                <c:pt idx="2">
+                  <c:v>16</c:v>
+                </c:pt>
+                <c:pt idx="3">
+                  <c:v>18</c:v>
+                </c:pt>
+                <c:pt idx="4">
+                  <c:v>10</c:v>
+                </c:pt>
+              </c:numCache>
+            </c:numRef>
+          </c:bubbleSize>
+          <c:bubble3D val="0"/>
+          <c:extLst>
+            <c:ext xmlns:c16="http://schemas.microsoft.com/office/drawing/2014/chart" uri="{C3380CC4-5D6E-409C-BE32-E72D297353CC}">
+              <c16:uniqueId val="{00000001-5E61-426B-A026-4AA584F30620}"/>
+            </c:ext>
+          </c:extLst>
+        </c:ser>
+        <c:ser>
+          <c:idx val="0"/>
+          <c:order val="1"/>
+          <c:tx>
+            <c:strRef>
+              <c:f>Tabelle1!$E$1</c:f>
+              <c:strCache>
+                <c:ptCount val="1"/>
+                <c:pt idx="0">
+                  <c:v>Series2-X</c:v>
+                </c:pt>
+              </c:strCache>
+            </c:strRef>
+          </c:tx>
+          <c:spPr>
+            <a:solidFill>
+              <a:srgbClr val="4472C4">
+                <a:alpha val="60000"/>
+              </a:srgbClr>
+            </a:solidFill>
+            <a:ln w="25400">
+              <a:solidFill>
+                <a:schemeClr val="bg1"/>
+              </a:solidFill>
+            </a:ln>
+            <a:effectLst/>
+          </c:spPr>
+          <c:invertIfNegative val="0"/>
+          <c:xVal>
+            <c:numRef>
+              <c:f>Tabelle1!$E$2:$E$6</c:f>
               <c:numCache>
                 <c:formatCode>General</c:formatCode>
                 <c:ptCount val="5"/>
@@ -191,134 +300,7 @@
           </c:xVal>
           <c:yVal>
             <c:numRef>
-              <c:f>Tabelle1!$B$2:$B$6</c:f>
-              <c:numCache>
-                <c:formatCode>General</c:formatCode>
-                <c:ptCount val="5"/>
-                <c:pt idx="0">
-                  <c:v>5</c:v>
-                </c:pt>
-                <c:pt idx="1">
-                  <c:v>4</c:v>
-                </c:pt>
-                <c:pt idx="2">
-                  <c:v>3</c:v>
-                </c:pt>
-                <c:pt idx="3">
-                  <c:v>4</c:v>
-                </c:pt>
-                <c:pt idx="4">
-                  <c:v>1</c:v>
-                </c:pt>
-              </c:numCache>
-            </c:numRef>
-          </c:yVal>
-          <c:bubbleSize>
-            <c:numRef>
-              <c:f>Tabelle1!$C$2:$C$6</c:f>
-              <c:numCache>
-                <c:formatCode>General</c:formatCode>
-                <c:ptCount val="5"/>
-                <c:pt idx="0">
-                  <c:v>10</c:v>
-                </c:pt>
-                <c:pt idx="1">
-                  <c:v>10</c:v>
-                </c:pt>
-                <c:pt idx="2">
-                  <c:v>10</c:v>
-                </c:pt>
-                <c:pt idx="3">
-                  <c:v>8</c:v>
-                </c:pt>
-                <c:pt idx="4">
-                  <c:v>15</c:v>
-                </c:pt>
-              </c:numCache>
-            </c:numRef>
-          </c:bubbleSize>
-          <c:bubble3D val="0"/>
-          <c:extLst>
-            <c:ext xmlns:c16="http://schemas.microsoft.com/office/drawing/2014/chart" uri="{C3380CC4-5D6E-409C-BE32-E72D297353CC}">
-              <c16:uniqueId val="{00000001-5E61-426B-A026-4AA584F30620}"/>
-            </c:ext>
-          </c:extLst>
-        </c:ser>
-        <c:ser>
-          <c:idx val="0"/>
-          <c:order val="1"/>
-          <c:tx>
-            <c:strRef>
-              <c:f>Tabelle1!$F$1</c:f>
-              <c:strCache>
-                <c:ptCount val="1"/>
-                <c:pt idx="0">
-                  <c:v>Size 1</c:v>
-                </c:pt>
-              </c:strCache>
-            </c:strRef>
-          </c:tx>
-          <c:spPr>
-            <a:solidFill>
-              <a:schemeClr val="accent1"/>
-            </a:solidFill>
-            <a:ln>
-              <a:noFill/>
-            </a:ln>
-            <a:effectLst/>
-          </c:spPr>
-          <c:invertIfNegative val="0"/>
-          <c:xVal>
-            <c:numRef>
               <c:f>Tabelle1!$F$2:$F$6</c:f>
-              <c:numCache>
-                <c:formatCode>General</c:formatCode>
-                <c:ptCount val="5"/>
-                <c:pt idx="0">
-                  <c:v>8</c:v>
-                </c:pt>
-                <c:pt idx="1">
-                  <c:v>12</c:v>
-                </c:pt>
-                <c:pt idx="2">
-                  <c:v>17</c:v>
-                </c:pt>
-                <c:pt idx="3">
-                  <c:v>22</c:v>
-                </c:pt>
-                <c:pt idx="4">
-                  <c:v>19</c:v>
-                </c:pt>
-              </c:numCache>
-            </c:numRef>
-          </c:xVal>
-          <c:yVal>
-            <c:numRef>
-              <c:f>Tabelle1!$B$2:$B$6</c:f>
-              <c:numCache>
-                <c:formatCode>General</c:formatCode>
-                <c:ptCount val="5"/>
-                <c:pt idx="0">
-                  <c:v>5</c:v>
-                </c:pt>
-                <c:pt idx="1">
-                  <c:v>4</c:v>
-                </c:pt>
-                <c:pt idx="2">
-                  <c:v>3</c:v>
-                </c:pt>
-                <c:pt idx="3">
-                  <c:v>4</c:v>
-                </c:pt>
-                <c:pt idx="4">
-                  <c:v>1</c:v>
-                </c:pt>
-              </c:numCache>
-            </c:numRef>
-          </c:yVal>
-          <c:bubbleSize>
-            <c:numRef>
-              <c:f>Tabelle1!$E$2:$E$6</c:f>
               <c:numCache>
                 <c:formatCode>General</c:formatCode>
                 <c:ptCount val="5"/>
@@ -339,87 +321,6 @@
                 </c:pt>
               </c:numCache>
             </c:numRef>
-          </c:bubbleSize>
-          <c:bubble3D val="0"/>
-          <c:extLst>
-            <c:ext xmlns:c16="http://schemas.microsoft.com/office/drawing/2014/chart" uri="{C3380CC4-5D6E-409C-BE32-E72D297353CC}">
-              <c16:uniqueId val="{00000000-82E7-4298-9BCB-98CC2F068070}"/>
-            </c:ext>
-          </c:extLst>
-        </c:ser>
-        <c:ser>
-          <c:idx val="2"/>
-          <c:order val="2"/>
-          <c:tx>
-            <c:strRef>
-              <c:f>Tabelle1!$H$1</c:f>
-              <c:strCache>
-                <c:ptCount val="1"/>
-                <c:pt idx="0">
-                  <c:v>Size 3</c:v>
-                </c:pt>
-              </c:strCache>
-            </c:strRef>
-          </c:tx>
-          <c:spPr>
-            <a:solidFill>
-              <a:srgbClr val="DBDBDB">
-                <a:alpha val="69804"/>
-              </a:srgbClr>
-            </a:solidFill>
-            <a:ln w="25400">
-              <a:noFill/>
-            </a:ln>
-            <a:effectLst/>
-          </c:spPr>
-          <c:invertIfNegative val="0"/>
-          <c:xVal>
-            <c:numRef>
-              <c:f>Tabelle1!$H$2:$H$7</c:f>
-              <c:numCache>
-                <c:formatCode>General</c:formatCode>
-                <c:ptCount val="6"/>
-                <c:pt idx="0">
-                  <c:v>10</c:v>
-                </c:pt>
-                <c:pt idx="1">
-                  <c:v>14</c:v>
-                </c:pt>
-                <c:pt idx="2">
-                  <c:v>12</c:v>
-                </c:pt>
-                <c:pt idx="3">
-                  <c:v>16</c:v>
-                </c:pt>
-                <c:pt idx="4">
-                  <c:v>18</c:v>
-                </c:pt>
-              </c:numCache>
-            </c:numRef>
-          </c:xVal>
-          <c:yVal>
-            <c:numRef>
-              <c:f>Tabelle1!$B$2:$B$6</c:f>
-              <c:numCache>
-                <c:formatCode>General</c:formatCode>
-                <c:ptCount val="5"/>
-                <c:pt idx="0">
-                  <c:v>5</c:v>
-                </c:pt>
-                <c:pt idx="1">
-                  <c:v>4</c:v>
-                </c:pt>
-                <c:pt idx="2">
-                  <c:v>3</c:v>
-                </c:pt>
-                <c:pt idx="3">
-                  <c:v>4</c:v>
-                </c:pt>
-                <c:pt idx="4">
-                  <c:v>1</c:v>
-                </c:pt>
-              </c:numCache>
-            </c:numRef>
           </c:yVal>
           <c:bubbleSize>
             <c:numRef>
@@ -428,19 +329,19 @@
                 <c:formatCode>General</c:formatCode>
                 <c:ptCount val="5"/>
                 <c:pt idx="0">
-                  <c:v>22</c:v>
+                  <c:v>5</c:v>
                 </c:pt>
                 <c:pt idx="1">
-                  <c:v>18</c:v>
+                  <c:v>6</c:v>
                 </c:pt>
                 <c:pt idx="2">
-                  <c:v>16</c:v>
+                  <c:v>7</c:v>
                 </c:pt>
                 <c:pt idx="3">
-                  <c:v>14</c:v>
+                  <c:v>8</c:v>
                 </c:pt>
                 <c:pt idx="4">
-                  <c:v>12</c:v>
+                  <c:v>9</c:v>
                 </c:pt>
               </c:numCache>
             </c:numRef>
@@ -448,7 +349,7 @@
           <c:bubble3D val="0"/>
           <c:extLst>
             <c:ext xmlns:c16="http://schemas.microsoft.com/office/drawing/2014/chart" uri="{C3380CC4-5D6E-409C-BE32-E72D297353CC}">
-              <c16:uniqueId val="{00000000-6CC4-488B-B83C-6FA46376F448}"/>
+              <c16:uniqueId val="{00000000-82E7-4298-9BCB-98CC2F068070}"/>
             </c:ext>
           </c:extLst>
         </c:ser>
@@ -591,6 +492,47 @@
         <a:effectLst/>
       </c:spPr>
     </c:plotArea>
+    <c:legend>
+      <c:legendPos val="r"/>
+      <c:layout>
+        <c:manualLayout>
+          <c:xMode val="edge"/>
+          <c:yMode val="edge"/>
+          <c:x val="0.83082000590040783"/>
+          <c:y val="0.40292451194722834"/>
+          <c:w val="0.15871506307757025"/>
+          <c:h val="0.24473313451157619"/>
+        </c:manualLayout>
+      </c:layout>
+      <c:overlay val="0"/>
+      <c:spPr>
+        <a:noFill/>
+        <a:ln>
+          <a:noFill/>
+        </a:ln>
+        <a:effectLst/>
+      </c:spPr>
+      <c:txPr>
+        <a:bodyPr rot="0" spcFirstLastPara="1" vertOverflow="ellipsis" vert="horz" wrap="square" anchor="ctr" anchorCtr="1"/>
+        <a:lstStyle/>
+        <a:p>
+          <a:pPr>
+            <a:defRPr sz="1197" b="0" i="0" u="none" strike="noStrike" kern="1200" baseline="0">
+              <a:solidFill>
+                <a:schemeClr val="tx1">
+                  <a:lumMod val="65000"/>
+                  <a:lumOff val="35000"/>
+                </a:schemeClr>
+              </a:solidFill>
+              <a:latin typeface="+mn-lt"/>
+              <a:ea typeface="+mn-ea"/>
+              <a:cs typeface="+mn-cs"/>
+            </a:defRPr>
+          </a:pPr>
+          <a:endParaRPr lang="de-DE"/>
+        </a:p>
+      </c:txPr>
+    </c:legend>
     <c:plotVisOnly val="1"/>
     <c:dispBlanksAs val="gap"/>
     <c:extLst>
@@ -1315,7 +1257,7 @@
           <a:p>
             <a:fld id="{8FB60A0F-5ED1-45ED-A5D5-DB038E6B70D9}" type="datetimeFigureOut">
               <a:rPr lang="de-DE" smtClean="0"/>
-              <a:t>25.03.2021</a:t>
+              <a:t>26.03.2021</a:t>
             </a:fld>
             <a:endParaRPr lang="de-DE"/>
           </a:p>
@@ -1513,7 +1455,7 @@
           <a:p>
             <a:fld id="{8FB60A0F-5ED1-45ED-A5D5-DB038E6B70D9}" type="datetimeFigureOut">
               <a:rPr lang="de-DE" smtClean="0"/>
-              <a:t>25.03.2021</a:t>
+              <a:t>26.03.2021</a:t>
             </a:fld>
             <a:endParaRPr lang="de-DE"/>
           </a:p>
@@ -1721,7 +1663,7 @@
           <a:p>
             <a:fld id="{8FB60A0F-5ED1-45ED-A5D5-DB038E6B70D9}" type="datetimeFigureOut">
               <a:rPr lang="de-DE" smtClean="0"/>
-              <a:t>25.03.2021</a:t>
+              <a:t>26.03.2021</a:t>
             </a:fld>
             <a:endParaRPr lang="de-DE"/>
           </a:p>
@@ -1919,7 +1861,7 @@
           <a:p>
             <a:fld id="{8FB60A0F-5ED1-45ED-A5D5-DB038E6B70D9}" type="datetimeFigureOut">
               <a:rPr lang="de-DE" smtClean="0"/>
-              <a:t>25.03.2021</a:t>
+              <a:t>26.03.2021</a:t>
             </a:fld>
             <a:endParaRPr lang="de-DE"/>
           </a:p>
@@ -2194,7 +2136,7 @@
           <a:p>
             <a:fld id="{8FB60A0F-5ED1-45ED-A5D5-DB038E6B70D9}" type="datetimeFigureOut">
               <a:rPr lang="de-DE" smtClean="0"/>
-              <a:t>25.03.2021</a:t>
+              <a:t>26.03.2021</a:t>
             </a:fld>
             <a:endParaRPr lang="de-DE"/>
           </a:p>
@@ -2459,7 +2401,7 @@
           <a:p>
             <a:fld id="{8FB60A0F-5ED1-45ED-A5D5-DB038E6B70D9}" type="datetimeFigureOut">
               <a:rPr lang="de-DE" smtClean="0"/>
-              <a:t>25.03.2021</a:t>
+              <a:t>26.03.2021</a:t>
             </a:fld>
             <a:endParaRPr lang="de-DE"/>
           </a:p>
@@ -2871,7 +2813,7 @@
           <a:p>
             <a:fld id="{8FB60A0F-5ED1-45ED-A5D5-DB038E6B70D9}" type="datetimeFigureOut">
               <a:rPr lang="de-DE" smtClean="0"/>
-              <a:t>25.03.2021</a:t>
+              <a:t>26.03.2021</a:t>
             </a:fld>
             <a:endParaRPr lang="de-DE"/>
           </a:p>
@@ -3012,7 +2954,7 @@
           <a:p>
             <a:fld id="{8FB60A0F-5ED1-45ED-A5D5-DB038E6B70D9}" type="datetimeFigureOut">
               <a:rPr lang="de-DE" smtClean="0"/>
-              <a:t>25.03.2021</a:t>
+              <a:t>26.03.2021</a:t>
             </a:fld>
             <a:endParaRPr lang="de-DE"/>
           </a:p>
@@ -3125,7 +3067,7 @@
           <a:p>
             <a:fld id="{8FB60A0F-5ED1-45ED-A5D5-DB038E6B70D9}" type="datetimeFigureOut">
               <a:rPr lang="de-DE" smtClean="0"/>
-              <a:t>25.03.2021</a:t>
+              <a:t>26.03.2021</a:t>
             </a:fld>
             <a:endParaRPr lang="de-DE"/>
           </a:p>
@@ -3436,7 +3378,7 @@
           <a:p>
             <a:fld id="{8FB60A0F-5ED1-45ED-A5D5-DB038E6B70D9}" type="datetimeFigureOut">
               <a:rPr lang="de-DE" smtClean="0"/>
-              <a:t>25.03.2021</a:t>
+              <a:t>26.03.2021</a:t>
             </a:fld>
             <a:endParaRPr lang="de-DE"/>
           </a:p>
@@ -3724,7 +3666,7 @@
           <a:p>
             <a:fld id="{8FB60A0F-5ED1-45ED-A5D5-DB038E6B70D9}" type="datetimeFigureOut">
               <a:rPr lang="de-DE" smtClean="0"/>
-              <a:t>25.03.2021</a:t>
+              <a:t>26.03.2021</a:t>
             </a:fld>
             <a:endParaRPr lang="de-DE"/>
           </a:p>
@@ -3965,7 +3907,7 @@
           <a:p>
             <a:fld id="{8FB60A0F-5ED1-45ED-A5D5-DB038E6B70D9}" type="datetimeFigureOut">
               <a:rPr lang="de-DE" smtClean="0"/>
-              <a:t>25.03.2021</a:t>
+              <a:t>26.03.2021</a:t>
             </a:fld>
             <a:endParaRPr lang="de-DE"/>
           </a:p>
@@ -4395,14 +4337,14 @@
           <p:nvPr>
             <p:extLst>
               <p:ext uri="{D42A27DB-BD31-4B8C-83A1-F6EECF244321}">
-                <p14:modId xmlns:p14="http://schemas.microsoft.com/office/powerpoint/2010/main" val="1050116623"/>
+                <p14:modId xmlns:p14="http://schemas.microsoft.com/office/powerpoint/2010/main" val="1987819947"/>
               </p:ext>
             </p:extLst>
           </p:nvPr>
         </p:nvGraphicFramePr>
         <p:xfrm>
-          <a:off x="1512606" y="1232430"/>
-          <a:ext cx="5910749" cy="4770437"/>
+          <a:off x="1072339" y="656697"/>
+          <a:ext cx="7958772" cy="4770437"/>
         </p:xfrm>
         <a:graphic>
           <a:graphicData uri="http://schemas.openxmlformats.org/drawingml/2006/chart">

</xml_diff>